<commit_message>
Godot update + scenes in excel
</commit_message>
<xml_diff>
--- a/Design Documents/Space/Temple Plan V1.pptx
+++ b/Design Documents/Space/Temple Plan V1.pptx
@@ -266,7 +266,7 @@
           <a:p>
             <a:fld id="{6BB56244-6E85-8E49-A387-627D86596223}" type="datetimeFigureOut">
               <a:rPr lang="en-CH" smtClean="0"/>
-              <a:t>23.08.2024</a:t>
+              <a:t>18.06.2025</a:t>
             </a:fld>
             <a:endParaRPr lang="en-CH"/>
           </a:p>
@@ -466,7 +466,7 @@
           <a:p>
             <a:fld id="{6BB56244-6E85-8E49-A387-627D86596223}" type="datetimeFigureOut">
               <a:rPr lang="en-CH" smtClean="0"/>
-              <a:t>23.08.2024</a:t>
+              <a:t>18.06.2025</a:t>
             </a:fld>
             <a:endParaRPr lang="en-CH"/>
           </a:p>
@@ -676,7 +676,7 @@
           <a:p>
             <a:fld id="{6BB56244-6E85-8E49-A387-627D86596223}" type="datetimeFigureOut">
               <a:rPr lang="en-CH" smtClean="0"/>
-              <a:t>23.08.2024</a:t>
+              <a:t>18.06.2025</a:t>
             </a:fld>
             <a:endParaRPr lang="en-CH"/>
           </a:p>
@@ -876,7 +876,7 @@
           <a:p>
             <a:fld id="{6BB56244-6E85-8E49-A387-627D86596223}" type="datetimeFigureOut">
               <a:rPr lang="en-CH" smtClean="0"/>
-              <a:t>23.08.2024</a:t>
+              <a:t>18.06.2025</a:t>
             </a:fld>
             <a:endParaRPr lang="en-CH"/>
           </a:p>
@@ -1152,7 +1152,7 @@
           <a:p>
             <a:fld id="{6BB56244-6E85-8E49-A387-627D86596223}" type="datetimeFigureOut">
               <a:rPr lang="en-CH" smtClean="0"/>
-              <a:t>23.08.2024</a:t>
+              <a:t>18.06.2025</a:t>
             </a:fld>
             <a:endParaRPr lang="en-CH"/>
           </a:p>
@@ -1420,7 +1420,7 @@
           <a:p>
             <a:fld id="{6BB56244-6E85-8E49-A387-627D86596223}" type="datetimeFigureOut">
               <a:rPr lang="en-CH" smtClean="0"/>
-              <a:t>23.08.2024</a:t>
+              <a:t>18.06.2025</a:t>
             </a:fld>
             <a:endParaRPr lang="en-CH"/>
           </a:p>
@@ -1835,7 +1835,7 @@
           <a:p>
             <a:fld id="{6BB56244-6E85-8E49-A387-627D86596223}" type="datetimeFigureOut">
               <a:rPr lang="en-CH" smtClean="0"/>
-              <a:t>23.08.2024</a:t>
+              <a:t>18.06.2025</a:t>
             </a:fld>
             <a:endParaRPr lang="en-CH"/>
           </a:p>
@@ -1977,7 +1977,7 @@
           <a:p>
             <a:fld id="{6BB56244-6E85-8E49-A387-627D86596223}" type="datetimeFigureOut">
               <a:rPr lang="en-CH" smtClean="0"/>
-              <a:t>23.08.2024</a:t>
+              <a:t>18.06.2025</a:t>
             </a:fld>
             <a:endParaRPr lang="en-CH"/>
           </a:p>
@@ -2090,7 +2090,7 @@
           <a:p>
             <a:fld id="{6BB56244-6E85-8E49-A387-627D86596223}" type="datetimeFigureOut">
               <a:rPr lang="en-CH" smtClean="0"/>
-              <a:t>23.08.2024</a:t>
+              <a:t>18.06.2025</a:t>
             </a:fld>
             <a:endParaRPr lang="en-CH"/>
           </a:p>
@@ -2403,7 +2403,7 @@
           <a:p>
             <a:fld id="{6BB56244-6E85-8E49-A387-627D86596223}" type="datetimeFigureOut">
               <a:rPr lang="en-CH" smtClean="0"/>
-              <a:t>23.08.2024</a:t>
+              <a:t>18.06.2025</a:t>
             </a:fld>
             <a:endParaRPr lang="en-CH"/>
           </a:p>
@@ -2692,7 +2692,7 @@
           <a:p>
             <a:fld id="{6BB56244-6E85-8E49-A387-627D86596223}" type="datetimeFigureOut">
               <a:rPr lang="en-CH" smtClean="0"/>
-              <a:t>23.08.2024</a:t>
+              <a:t>18.06.2025</a:t>
             </a:fld>
             <a:endParaRPr lang="en-CH"/>
           </a:p>
@@ -2935,7 +2935,7 @@
           <a:p>
             <a:fld id="{6BB56244-6E85-8E49-A387-627D86596223}" type="datetimeFigureOut">
               <a:rPr lang="en-CH" smtClean="0"/>
-              <a:t>23.08.2024</a:t>
+              <a:t>18.06.2025</a:t>
             </a:fld>
             <a:endParaRPr lang="en-CH"/>
           </a:p>
@@ -4460,8 +4460,8 @@
         </p:nvSpPr>
         <p:spPr>
           <a:xfrm>
-            <a:off x="9323882" y="1034321"/>
-            <a:ext cx="1726627" cy="646331"/>
+            <a:off x="7992387" y="1018279"/>
+            <a:ext cx="3264996" cy="1477328"/>
           </a:xfrm>
           <a:prstGeom prst="rect">
             <a:avLst/>
@@ -4483,6 +4483,24 @@
             <a:r>
               <a:rPr lang="en-CH" dirty="0"/>
               <a:t>Blue = see</a:t>
+            </a:r>
+          </a:p>
+          <a:p>
+            <a:r>
+              <a:rPr lang="en-CH" dirty="0"/>
+              <a:t>Orange = “locked”</a:t>
+            </a:r>
+          </a:p>
+          <a:p>
+            <a:r>
+              <a:rPr lang="en-CH" dirty="0"/>
+              <a:t>Yellow = one way</a:t>
+            </a:r>
+          </a:p>
+          <a:p>
+            <a:r>
+              <a:rPr lang="en-CH" dirty="0"/>
+              <a:t>Dotted = passage due to damage</a:t>
             </a:r>
           </a:p>
         </p:txBody>
@@ -6639,7 +6657,7 @@
           </a:prstGeom>
           <a:ln w="12700" cmpd="sng">
             <a:solidFill>
-              <a:srgbClr val="FF0000"/>
+              <a:schemeClr val="accent4"/>
             </a:solidFill>
             <a:prstDash val="sysDash"/>
             <a:miter lim="800000"/>
@@ -7188,7 +7206,7 @@
           </a:prstGeom>
           <a:ln w="12700">
             <a:solidFill>
-              <a:schemeClr val="accent6"/>
+              <a:schemeClr val="accent2"/>
             </a:solidFill>
             <a:headEnd type="triangle"/>
             <a:tailEnd type="triangle"/>
@@ -7577,7 +7595,7 @@
               <a:schemeClr val="accent6"/>
             </a:solidFill>
             <a:headEnd type="triangle"/>
-            <a:tailEnd type="triangle"/>
+            <a:tailEnd type="none"/>
           </a:ln>
         </p:spPr>
         <p:style>
@@ -7858,7 +7876,7 @@
           </a:prstGeom>
           <a:ln w="12700">
             <a:solidFill>
-              <a:schemeClr val="accent6"/>
+              <a:schemeClr val="accent2"/>
             </a:solidFill>
             <a:headEnd type="triangle"/>
             <a:tailEnd type="triangle"/>
@@ -7907,7 +7925,7 @@
           </a:prstGeom>
           <a:ln w="12700">
             <a:solidFill>
-              <a:schemeClr val="accent6"/>
+              <a:schemeClr val="accent2"/>
             </a:solidFill>
             <a:headEnd type="triangle"/>
             <a:tailEnd type="triangle"/>
@@ -7956,7 +7974,7 @@
           </a:prstGeom>
           <a:ln w="12700">
             <a:solidFill>
-              <a:schemeClr val="accent6"/>
+              <a:schemeClr val="accent2"/>
             </a:solidFill>
             <a:headEnd type="triangle"/>
             <a:tailEnd type="triangle"/>
@@ -8188,6 +8206,41 @@
           </a:fontRef>
         </p:style>
       </p:cxnSp>
+      <p:sp>
+        <p:nvSpPr>
+          <p:cNvPr id="2" name="TextBox 1">
+            <a:extLst>
+              <a:ext uri="{FF2B5EF4-FFF2-40B4-BE49-F238E27FC236}">
+                <a16:creationId xmlns:a16="http://schemas.microsoft.com/office/drawing/2014/main" id="{BE40535B-384D-3EB7-F294-B6349E2F3130}"/>
+              </a:ext>
+            </a:extLst>
+          </p:cNvPr>
+          <p:cNvSpPr txBox="1"/>
+          <p:nvPr/>
+        </p:nvSpPr>
+        <p:spPr>
+          <a:xfrm>
+            <a:off x="9432757" y="1909011"/>
+            <a:ext cx="1172116" cy="246221"/>
+          </a:xfrm>
+          <a:prstGeom prst="rect">
+            <a:avLst/>
+          </a:prstGeom>
+          <a:noFill/>
+        </p:spPr>
+        <p:txBody>
+          <a:bodyPr wrap="none" rtlCol="0">
+            <a:spAutoFit/>
+          </a:bodyPr>
+          <a:lstStyle/>
+          <a:p>
+            <a:r>
+              <a:rPr lang="en-CH" sz="1000" dirty="0"/>
+              <a:t>rubbles -&gt; one way</a:t>
+            </a:r>
+          </a:p>
+        </p:txBody>
+      </p:sp>
     </p:spTree>
     <p:extLst>
       <p:ext uri="{BB962C8B-B14F-4D97-AF65-F5344CB8AC3E}">
@@ -8657,7 +8710,7 @@
           </a:prstGeom>
           <a:ln w="12700">
             <a:solidFill>
-              <a:schemeClr val="accent6"/>
+              <a:schemeClr val="accent2"/>
             </a:solidFill>
             <a:headEnd type="triangle"/>
             <a:tailEnd type="triangle"/>

</xml_diff>

<commit_message>
Worked on info (previously called scene) excel file
</commit_message>
<xml_diff>
--- a/Design Documents/Space/Temple Plan V1.pptx
+++ b/Design Documents/Space/Temple Plan V1.pptx
@@ -5438,7 +5438,7 @@
                   <a:schemeClr val="tx1"/>
                 </a:solidFill>
               </a:rPr>
-              <a:t>Visitor/Waiting Room</a:t>
+              <a:t>Waiting Room</a:t>
             </a:r>
           </a:p>
         </p:txBody>
@@ -6216,8 +6216,20 @@
                   <a:schemeClr val="tx1"/>
                 </a:solidFill>
               </a:rPr>
-              <a:t>Crafting (art) Room</a:t>
-            </a:r>
+              <a:t>Crafting  Room</a:t>
+            </a:r>
+            <a:br>
+              <a:rPr lang="en-CH" dirty="0">
+                <a:solidFill>
+                  <a:schemeClr val="tx1"/>
+                </a:solidFill>
+              </a:rPr>
+            </a:br>
+            <a:endParaRPr lang="en-CH" dirty="0">
+              <a:solidFill>
+                <a:schemeClr val="tx1"/>
+              </a:solidFill>
+            </a:endParaRPr>
           </a:p>
         </p:txBody>
       </p:sp>
@@ -6295,7 +6307,7 @@
           </a:prstGeom>
           <a:ln w="12700" cmpd="sng">
             <a:solidFill>
-              <a:schemeClr val="accent6"/>
+              <a:schemeClr val="accent2"/>
             </a:solidFill>
             <a:miter lim="800000"/>
             <a:headEnd type="triangle"/>
@@ -6561,7 +6573,7 @@
           </a:prstGeom>
           <a:ln w="12700">
             <a:solidFill>
-              <a:schemeClr val="accent6"/>
+              <a:schemeClr val="accent2"/>
             </a:solidFill>
             <a:headEnd type="triangle"/>
             <a:tailEnd type="triangle"/>
@@ -6608,7 +6620,7 @@
           </a:prstGeom>
           <a:ln w="12700">
             <a:solidFill>
-              <a:schemeClr val="accent6"/>
+              <a:schemeClr val="accent2"/>
             </a:solidFill>
             <a:headEnd type="triangle"/>
             <a:tailEnd type="triangle"/>
@@ -7111,7 +7123,7 @@
                   <a:schemeClr val="tx1"/>
                 </a:solidFill>
               </a:rPr>
-              <a:t>Common Prayer Room</a:t>
+              <a:t>Prayer Room</a:t>
             </a:r>
           </a:p>
         </p:txBody>
@@ -7719,7 +7731,22 @@
                   <a:schemeClr val="tx1"/>
                 </a:solidFill>
               </a:rPr>
-              <a:t>Room 1</a:t>
+              <a:t>RO’s Room</a:t>
+            </a:r>
+            <a:br>
+              <a:rPr lang="en-CH" dirty="0">
+                <a:solidFill>
+                  <a:schemeClr val="tx1"/>
+                </a:solidFill>
+              </a:rPr>
+            </a:br>
+            <a:r>
+              <a:rPr lang="en-CH" dirty="0">
+                <a:solidFill>
+                  <a:schemeClr val="tx1"/>
+                </a:solidFill>
+              </a:rPr>
+              <a:t>(EO’s old Room)</a:t>
             </a:r>
           </a:p>
         </p:txBody>
@@ -7781,7 +7808,22 @@
                   <a:schemeClr val="tx1"/>
                 </a:solidFill>
               </a:rPr>
-              <a:t>Room 2</a:t>
+              <a:t>SO’s Room</a:t>
+            </a:r>
+            <a:br>
+              <a:rPr lang="en-CH" dirty="0">
+                <a:solidFill>
+                  <a:schemeClr val="tx1"/>
+                </a:solidFill>
+              </a:rPr>
+            </a:br>
+            <a:r>
+              <a:rPr lang="en-CH" dirty="0">
+                <a:solidFill>
+                  <a:schemeClr val="tx1"/>
+                </a:solidFill>
+              </a:rPr>
+              <a:t>(RO’s old Room)</a:t>
             </a:r>
           </a:p>
         </p:txBody>
@@ -7843,7 +7885,7 @@
                   <a:schemeClr val="tx1"/>
                 </a:solidFill>
               </a:rPr>
-              <a:t>Room 3</a:t>
+              <a:t>LO’s Room</a:t>
             </a:r>
           </a:p>
         </p:txBody>

</xml_diff>